<commit_message>
JS Fundaments Homework Update
</commit_message>
<xml_diff>
--- a/Web Design & Development/3. JavaScript - Fundamentals/07. Strings/Strings.pptx
+++ b/Web Design & Development/3. JavaScript - Fundamentals/07. Strings/Strings.pptx
@@ -147,7 +147,7 @@
   </p:defaultTextStyle>
   <p:extLst>
     <p:ext uri="{EFAFB233-063F-42B5-8137-9DF3F51BA10A}">
-      <p15:sldGuideLst xmlns:p15="http://schemas.microsoft.com/office/powerpoint/2012/main"/>
+      <p15:sldGuideLst xmlns:p15="http://schemas.microsoft.com/office/powerpoint/2012/main" xmlns=""/>
     </p:ext>
   </p:extLst>
 </p:presentation>
@@ -235,7 +235,7 @@
           <a:p>
             <a:fld id="{F35A18E2-9294-4467-8151-57ABCEB4C41F}" type="datetimeFigureOut">
               <a:rPr lang="en-US" smtClean="0"/>
-              <a:t>3/21/2013</a:t>
+              <a:t>2/4/2014</a:t>
             </a:fld>
             <a:endParaRPr lang="en-US" dirty="0"/>
           </a:p>
@@ -13996,18 +13996,7 @@
                   </a:schemeClr>
                 </a:solidFill>
               </a:rPr>
-              <a:t>result</a:t>
-            </a:r>
-            <a:r>
-              <a:rPr lang="en-US" sz="2800" dirty="0" smtClean="0">
-                <a:solidFill>
-                  <a:schemeClr val="tx1">
-                    <a:lumMod val="40000"/>
-                    <a:lumOff val="60000"/>
-                  </a:schemeClr>
-                </a:solidFill>
-              </a:rPr>
-              <a:t>:</a:t>
+              <a:t>result:</a:t>
             </a:r>
             <a:endParaRPr lang="en-US" sz="2800" dirty="0" smtClean="0">
               <a:solidFill>
@@ -15755,113 +15744,6 @@
               <a:t>36</a:t>
             </a:fld>
             <a:endParaRPr lang="en-US" dirty="0"/>
-          </a:p>
-        </p:txBody>
-      </p:sp>
-      <p:sp>
-        <p:nvSpPr>
-          <p:cNvPr id="5" name="Text Box 4"/>
-          <p:cNvSpPr txBox="1">
-            <a:spLocks noChangeArrowheads="1"/>
-          </p:cNvSpPr>
-          <p:nvPr/>
-        </p:nvSpPr>
-        <p:spPr bwMode="auto">
-          <a:xfrm>
-            <a:off x="827088" y="5283215"/>
-            <a:ext cx="7343775" cy="738664"/>
-          </a:xfrm>
-          <a:prstGeom prst="rect">
-            <a:avLst/>
-          </a:prstGeom>
-          <a:solidFill>
-            <a:schemeClr val="accent5">
-              <a:lumMod val="40000"/>
-              <a:lumOff val="60000"/>
-              <a:alpha val="15000"/>
-            </a:schemeClr>
-          </a:solidFill>
-          <a:ln w="12700">
-            <a:solidFill>
-              <a:schemeClr val="accent5">
-                <a:lumMod val="60000"/>
-                <a:lumOff val="40000"/>
-              </a:schemeClr>
-            </a:solidFill>
-          </a:ln>
-        </p:spPr>
-        <p:txBody>
-          <a:bodyPr wrap="square">
-            <a:spAutoFit/>
-          </a:bodyPr>
-          <a:lstStyle/>
-          <a:p>
-            <a:pPr eaLnBrk="0" hangingPunct="0">
-              <a:lnSpc>
-                <a:spcPct val="105000"/>
-              </a:lnSpc>
-              <a:spcBef>
-                <a:spcPts val="0"/>
-              </a:spcBef>
-              <a:buClr>
-                <a:schemeClr val="accent5">
-                  <a:lumMod val="40000"/>
-                  <a:lumOff val="60000"/>
-                </a:schemeClr>
-              </a:buClr>
-              <a:buSzPct val="70000"/>
-            </a:pPr>
-            <a:r>
-              <a:rPr lang="en-US" altLang="ja-JP" sz="2000" b="1" noProof="1" smtClean="0">
-                <a:solidFill>
-                  <a:srgbClr val="8CF4F2"/>
-                </a:solidFill>
-                <a:effectLst>
-                  <a:outerShdw blurRad="38100" dist="38100" dir="2700000" algn="tl">
-                    <a:srgbClr val="000000">
-                      <a:alpha val="43137"/>
-                    </a:srgbClr>
-                  </a:outerShdw>
-                </a:effectLst>
-                <a:latin typeface="Consolas" pitchFamily="49" charset="0"/>
-                <a:cs typeface="Consolas" pitchFamily="49" charset="0"/>
-              </a:rPr>
-              <a:t>var str = stringFormat("Hello {0}!","Peter");</a:t>
-            </a:r>
-          </a:p>
-          <a:p>
-            <a:pPr eaLnBrk="0" hangingPunct="0">
-              <a:lnSpc>
-                <a:spcPct val="105000"/>
-              </a:lnSpc>
-              <a:spcBef>
-                <a:spcPts val="0"/>
-              </a:spcBef>
-              <a:buClr>
-                <a:schemeClr val="accent5">
-                  <a:lumMod val="40000"/>
-                  <a:lumOff val="60000"/>
-                </a:schemeClr>
-              </a:buClr>
-              <a:buSzPct val="70000"/>
-            </a:pPr>
-            <a:r>
-              <a:rPr lang="en-US" altLang="ja-JP" sz="2000" b="1" noProof="1" smtClean="0">
-                <a:solidFill>
-                  <a:srgbClr val="8CF4F2"/>
-                </a:solidFill>
-                <a:effectLst>
-                  <a:outerShdw blurRad="38100" dist="38100" dir="2700000" algn="tl">
-                    <a:srgbClr val="000000">
-                      <a:alpha val="43137"/>
-                    </a:srgbClr>
-                  </a:outerShdw>
-                </a:effectLst>
-                <a:latin typeface="Consolas" pitchFamily="49" charset="0"/>
-                <a:cs typeface="Consolas" pitchFamily="49" charset="0"/>
-              </a:rPr>
-              <a:t>//str = "Hello Peter!";</a:t>
-            </a:r>
           </a:p>
         </p:txBody>
       </p:sp>
@@ -19630,7 +19512,7 @@
     </a:clrScheme>
     <a:fontScheme name="Office">
       <a:majorFont>
-        <a:latin typeface="Calibri Light" panose="020F0302020204030204"/>
+        <a:latin typeface="Calibri Light"/>
         <a:ea typeface=""/>
         <a:cs typeface=""/>
         <a:font script="Jpan" typeface="ＭＳ Ｐゴシック"/>
@@ -19665,7 +19547,7 @@
         <a:font script="Geor" typeface="Sylfaen"/>
       </a:majorFont>
       <a:minorFont>
-        <a:latin typeface="Calibri" panose="020F0502020204030204"/>
+        <a:latin typeface="Calibri"/>
         <a:ea typeface=""/>
         <a:cs typeface=""/>
         <a:font script="Jpan" typeface="ＭＳ Ｐゴシック"/>
@@ -19842,7 +19724,7 @@
   <a:extraClrSchemeLst/>
   <a:extLst>
     <a:ext uri="{05A4C25C-085E-4340-85A3-A5531E510DB2}">
-      <thm15:themeFamily xmlns:thm15="http://schemas.microsoft.com/office/thememl/2012/main" name="Office Theme" id="{62F939B6-93AF-4DB8-9C6B-D6C7DFDC589F}" vid="{4A3C46E8-61CC-4603-A589-7422A47A8E4A}"/>
+      <thm15:themeFamily xmlns:thm15="http://schemas.microsoft.com/office/thememl/2012/main" xmlns="" name="Office Theme" id="{62F939B6-93AF-4DB8-9C6B-D6C7DFDC589F}" vid="{4A3C46E8-61CC-4603-A589-7422A47A8E4A}"/>
     </a:ext>
   </a:extLst>
 </a:theme>

</xml_diff>

<commit_message>
JS Fundaments - String HW Update
</commit_message>
<xml_diff>
--- a/Web Design & Development/3. JavaScript - Fundamentals/07. Strings/Strings.pptx
+++ b/Web Design & Development/3. JavaScript - Fundamentals/07. Strings/Strings.pptx
@@ -147,7 +147,7 @@
   </p:defaultTextStyle>
   <p:extLst>
     <p:ext uri="{EFAFB233-063F-42B5-8137-9DF3F51BA10A}">
-      <p15:sldGuideLst xmlns:p15="http://schemas.microsoft.com/office/powerpoint/2012/main" xmlns=""/>
+      <p15:sldGuideLst xmlns="" xmlns:p15="http://schemas.microsoft.com/office/powerpoint/2012/main"/>
     </p:ext>
   </p:extLst>
 </p:presentation>
@@ -235,7 +235,7 @@
           <a:p>
             <a:fld id="{F35A18E2-9294-4467-8151-57ABCEB4C41F}" type="datetimeFigureOut">
               <a:rPr lang="en-US" smtClean="0"/>
-              <a:t>2/4/2014</a:t>
+              <a:t>2/5/2014</a:t>
             </a:fld>
             <a:endParaRPr lang="en-US" dirty="0"/>
           </a:p>
@@ -19724,7 +19724,7 @@
   <a:extraClrSchemeLst/>
   <a:extLst>
     <a:ext uri="{05A4C25C-085E-4340-85A3-A5531E510DB2}">
-      <thm15:themeFamily xmlns:thm15="http://schemas.microsoft.com/office/thememl/2012/main" xmlns="" name="Office Theme" id="{62F939B6-93AF-4DB8-9C6B-D6C7DFDC589F}" vid="{4A3C46E8-61CC-4603-A589-7422A47A8E4A}"/>
+      <thm15:themeFamily xmlns="" xmlns:thm15="http://schemas.microsoft.com/office/thememl/2012/main" name="Office Theme" id="{62F939B6-93AF-4DB8-9C6B-D6C7DFDC589F}" vid="{4A3C46E8-61CC-4603-A589-7422A47A8E4A}"/>
     </a:ext>
   </a:extLst>
 </a:theme>

</xml_diff>